<commit_message>
GlobalExp Handling in SpringBoot demos and notes
</commit_message>
<xml_diff>
--- a/Week5_REST_API/S24 Handling correct error codes, .pptx
+++ b/Week5_REST_API/S24 Handling correct error codes, .pptx
@@ -226,7 +226,7 @@
           <a:p>
             <a:fld id="{D7A846FA-0421-4F7C-A92D-B4B7AEE8ABE8}" type="datetimeFigureOut">
               <a:rPr lang="en-US" smtClean="0"/>
-              <a:t>3/9/2023</a:t>
+              <a:t>3/14/2023</a:t>
             </a:fld>
             <a:endParaRPr lang="en-US"/>
           </a:p>
@@ -515,7 +515,7 @@
           <p:cNvPr id="2" name="Title 1">
             <a:extLst>
               <a:ext uri="{FF2B5EF4-FFF2-40B4-BE49-F238E27FC236}">
-                <a16:creationId xmlns:a16="http://schemas.microsoft.com/office/drawing/2014/main" id="{67C60BBC-6349-444D-A301-236DE2CF341D}"/>
+                <a16:creationId xmlns:a16="http://schemas.microsoft.com/office/drawing/2014/main" xmlns="" id="{67C60BBC-6349-444D-A301-236DE2CF341D}"/>
               </a:ext>
             </a:extLst>
           </p:cNvPr>
@@ -556,7 +556,7 @@
           <p:cNvPr id="3" name="Subtitle 2">
             <a:extLst>
               <a:ext uri="{FF2B5EF4-FFF2-40B4-BE49-F238E27FC236}">
-                <a16:creationId xmlns:a16="http://schemas.microsoft.com/office/drawing/2014/main" id="{B1D6E939-9F0A-47E6-9CD5-6DA0A3B15DD6}"/>
+                <a16:creationId xmlns:a16="http://schemas.microsoft.com/office/drawing/2014/main" xmlns="" id="{B1D6E939-9F0A-47E6-9CD5-6DA0A3B15DD6}"/>
               </a:ext>
             </a:extLst>
           </p:cNvPr>
@@ -660,7 +660,7 @@
           <p:cNvPr id="2" name="Title 1">
             <a:extLst>
               <a:ext uri="{FF2B5EF4-FFF2-40B4-BE49-F238E27FC236}">
-                <a16:creationId xmlns:a16="http://schemas.microsoft.com/office/drawing/2014/main" id="{FB36AD94-C961-4D11-9A0B-345A6402795F}"/>
+                <a16:creationId xmlns:a16="http://schemas.microsoft.com/office/drawing/2014/main" xmlns="" id="{FB36AD94-C961-4D11-9A0B-345A6402795F}"/>
               </a:ext>
             </a:extLst>
           </p:cNvPr>
@@ -728,7 +728,7 @@
           <p:cNvPr id="2" name="Title 1">
             <a:extLst>
               <a:ext uri="{FF2B5EF4-FFF2-40B4-BE49-F238E27FC236}">
-                <a16:creationId xmlns:a16="http://schemas.microsoft.com/office/drawing/2014/main" id="{A18A6A40-B03F-49CF-A48C-7795723899BB}"/>
+                <a16:creationId xmlns:a16="http://schemas.microsoft.com/office/drawing/2014/main" xmlns="" id="{A18A6A40-B03F-49CF-A48C-7795723899BB}"/>
               </a:ext>
             </a:extLst>
           </p:cNvPr>
@@ -766,7 +766,7 @@
           <p:cNvPr id="3" name="Subtitle 2">
             <a:extLst>
               <a:ext uri="{FF2B5EF4-FFF2-40B4-BE49-F238E27FC236}">
-                <a16:creationId xmlns:a16="http://schemas.microsoft.com/office/drawing/2014/main" id="{D94C247B-A178-4664-BF1D-771AA2E91554}"/>
+                <a16:creationId xmlns:a16="http://schemas.microsoft.com/office/drawing/2014/main" xmlns="" id="{D94C247B-A178-4664-BF1D-771AA2E91554}"/>
               </a:ext>
             </a:extLst>
           </p:cNvPr>
@@ -867,7 +867,7 @@
           <p:cNvPr id="2" name="Title 1">
             <a:extLst>
               <a:ext uri="{FF2B5EF4-FFF2-40B4-BE49-F238E27FC236}">
-                <a16:creationId xmlns:a16="http://schemas.microsoft.com/office/drawing/2014/main" id="{61B6EE4A-AD7B-493D-ACEF-8139213E5BB2}"/>
+                <a16:creationId xmlns:a16="http://schemas.microsoft.com/office/drawing/2014/main" xmlns="" id="{61B6EE4A-AD7B-493D-ACEF-8139213E5BB2}"/>
               </a:ext>
             </a:extLst>
           </p:cNvPr>
@@ -896,7 +896,7 @@
           <p:cNvPr id="3" name="Content Placeholder 2">
             <a:extLst>
               <a:ext uri="{FF2B5EF4-FFF2-40B4-BE49-F238E27FC236}">
-                <a16:creationId xmlns:a16="http://schemas.microsoft.com/office/drawing/2014/main" id="{5F11330A-4FF5-4BE8-84C7-B6B670C30437}"/>
+                <a16:creationId xmlns:a16="http://schemas.microsoft.com/office/drawing/2014/main" xmlns="" id="{5F11330A-4FF5-4BE8-84C7-B6B670C30437}"/>
               </a:ext>
             </a:extLst>
           </p:cNvPr>
@@ -984,7 +984,7 @@
           <p:cNvPr id="2" name="Title 1">
             <a:extLst>
               <a:ext uri="{FF2B5EF4-FFF2-40B4-BE49-F238E27FC236}">
-                <a16:creationId xmlns:a16="http://schemas.microsoft.com/office/drawing/2014/main" id="{47E8133F-AE8B-41C2-8ABD-1BBD0A833304}"/>
+                <a16:creationId xmlns:a16="http://schemas.microsoft.com/office/drawing/2014/main" xmlns="" id="{47E8133F-AE8B-41C2-8ABD-1BBD0A833304}"/>
               </a:ext>
             </a:extLst>
           </p:cNvPr>
@@ -1022,7 +1022,7 @@
           <p:cNvPr id="3" name="Text Placeholder 2">
             <a:extLst>
               <a:ext uri="{FF2B5EF4-FFF2-40B4-BE49-F238E27FC236}">
-                <a16:creationId xmlns:a16="http://schemas.microsoft.com/office/drawing/2014/main" id="{C6FEC1D1-4BD0-4EC9-99ED-53AA90C7B531}"/>
+                <a16:creationId xmlns:a16="http://schemas.microsoft.com/office/drawing/2014/main" xmlns="" id="{C6FEC1D1-4BD0-4EC9-99ED-53AA90C7B531}"/>
               </a:ext>
             </a:extLst>
           </p:cNvPr>
@@ -1177,7 +1177,7 @@
           <p:cNvPr id="2" name="Title 1">
             <a:extLst>
               <a:ext uri="{FF2B5EF4-FFF2-40B4-BE49-F238E27FC236}">
-                <a16:creationId xmlns:a16="http://schemas.microsoft.com/office/drawing/2014/main" id="{2F373222-1024-4287-B34A-8D9CFA921C0F}"/>
+                <a16:creationId xmlns:a16="http://schemas.microsoft.com/office/drawing/2014/main" xmlns="" id="{2F373222-1024-4287-B34A-8D9CFA921C0F}"/>
               </a:ext>
             </a:extLst>
           </p:cNvPr>
@@ -1252,7 +1252,7 @@
           <p:cNvPr id="2" name="Title 1">
             <a:extLst>
               <a:ext uri="{FF2B5EF4-FFF2-40B4-BE49-F238E27FC236}">
-                <a16:creationId xmlns:a16="http://schemas.microsoft.com/office/drawing/2014/main" id="{2F373222-1024-4287-B34A-8D9CFA921C0F}"/>
+                <a16:creationId xmlns:a16="http://schemas.microsoft.com/office/drawing/2014/main" xmlns="" id="{2F373222-1024-4287-B34A-8D9CFA921C0F}"/>
               </a:ext>
             </a:extLst>
           </p:cNvPr>
@@ -1324,7 +1324,7 @@
           <p:cNvPr id="8" name="Picture 7" descr="A picture containing background pattern&#10;&#10;Description automatically generated">
             <a:extLst>
               <a:ext uri="{FF2B5EF4-FFF2-40B4-BE49-F238E27FC236}">
-                <a16:creationId xmlns:a16="http://schemas.microsoft.com/office/drawing/2014/main" id="{68407B9F-3EBF-4676-9D4A-DB3E02590894}"/>
+                <a16:creationId xmlns:a16="http://schemas.microsoft.com/office/drawing/2014/main" xmlns="" id="{68407B9F-3EBF-4676-9D4A-DB3E02590894}"/>
               </a:ext>
             </a:extLst>
           </p:cNvPr>
@@ -1360,7 +1360,7 @@
           <p:cNvPr id="10" name="Picture 9" descr="Logo&#10;&#10;Description automatically generated">
             <a:extLst>
               <a:ext uri="{FF2B5EF4-FFF2-40B4-BE49-F238E27FC236}">
-                <a16:creationId xmlns:a16="http://schemas.microsoft.com/office/drawing/2014/main" id="{B36087F9-89DD-4614-8CC2-87F4B93FECC0}"/>
+                <a16:creationId xmlns:a16="http://schemas.microsoft.com/office/drawing/2014/main" xmlns="" id="{B36087F9-89DD-4614-8CC2-87F4B93FECC0}"/>
               </a:ext>
             </a:extLst>
           </p:cNvPr>
@@ -1712,7 +1712,7 @@
           <p:cNvPr id="8" name="Picture 7" descr="A picture containing shape&#10;&#10;Description automatically generated">
             <a:extLst>
               <a:ext uri="{FF2B5EF4-FFF2-40B4-BE49-F238E27FC236}">
-                <a16:creationId xmlns:a16="http://schemas.microsoft.com/office/drawing/2014/main" id="{2A9E1631-45C4-43B8-A26E-30C5BDC0D370}"/>
+                <a16:creationId xmlns:a16="http://schemas.microsoft.com/office/drawing/2014/main" xmlns="" id="{2A9E1631-45C4-43B8-A26E-30C5BDC0D370}"/>
               </a:ext>
             </a:extLst>
           </p:cNvPr>
@@ -1748,7 +1748,7 @@
           <p:cNvPr id="2" name="Title Placeholder 1">
             <a:extLst>
               <a:ext uri="{FF2B5EF4-FFF2-40B4-BE49-F238E27FC236}">
-                <a16:creationId xmlns:a16="http://schemas.microsoft.com/office/drawing/2014/main" id="{D96DF0FC-D165-4A90-B38D-9DA75175DCBF}"/>
+                <a16:creationId xmlns:a16="http://schemas.microsoft.com/office/drawing/2014/main" xmlns="" id="{D96DF0FC-D165-4A90-B38D-9DA75175DCBF}"/>
               </a:ext>
             </a:extLst>
           </p:cNvPr>
@@ -1787,7 +1787,7 @@
           <p:cNvPr id="3" name="Text Placeholder 2">
             <a:extLst>
               <a:ext uri="{FF2B5EF4-FFF2-40B4-BE49-F238E27FC236}">
-                <a16:creationId xmlns:a16="http://schemas.microsoft.com/office/drawing/2014/main" id="{20E594D5-954E-40EC-A1AF-F7FAEB39F07D}"/>
+                <a16:creationId xmlns:a16="http://schemas.microsoft.com/office/drawing/2014/main" xmlns="" id="{20E594D5-954E-40EC-A1AF-F7FAEB39F07D}"/>
               </a:ext>
             </a:extLst>
           </p:cNvPr>
@@ -2177,7 +2177,7 @@
           <p:cNvPr id="8" name="Picture 7" descr="A picture containing outdoor object&#10;&#10;Description automatically generated">
             <a:extLst>
               <a:ext uri="{FF2B5EF4-FFF2-40B4-BE49-F238E27FC236}">
-                <a16:creationId xmlns:a16="http://schemas.microsoft.com/office/drawing/2014/main" id="{5D2BB16F-3BDA-48B6-853A-3C3488600FA2}"/>
+                <a16:creationId xmlns:a16="http://schemas.microsoft.com/office/drawing/2014/main" xmlns="" id="{5D2BB16F-3BDA-48B6-853A-3C3488600FA2}"/>
               </a:ext>
             </a:extLst>
           </p:cNvPr>
@@ -2532,7 +2532,7 @@
           <p:cNvPr id="3" name="Picture 2" descr="A picture containing light&#10;&#10;Description automatically generated">
             <a:extLst>
               <a:ext uri="{FF2B5EF4-FFF2-40B4-BE49-F238E27FC236}">
-                <a16:creationId xmlns:a16="http://schemas.microsoft.com/office/drawing/2014/main" id="{BB932DD9-5F92-4CE2-9E1D-3C2A12D4585F}"/>
+                <a16:creationId xmlns:a16="http://schemas.microsoft.com/office/drawing/2014/main" xmlns="" id="{BB932DD9-5F92-4CE2-9E1D-3C2A12D4585F}"/>
               </a:ext>
             </a:extLst>
           </p:cNvPr>
@@ -2878,7 +2878,7 @@
           <p:cNvPr id="2" name="Title 1">
             <a:extLst>
               <a:ext uri="{FF2B5EF4-FFF2-40B4-BE49-F238E27FC236}">
-                <a16:creationId xmlns:a16="http://schemas.microsoft.com/office/drawing/2014/main" id="{177E1A6A-BF0A-4C76-B7A5-2218BBDC01FE}"/>
+                <a16:creationId xmlns:a16="http://schemas.microsoft.com/office/drawing/2014/main" xmlns="" id="{177E1A6A-BF0A-4C76-B7A5-2218BBDC01FE}"/>
               </a:ext>
             </a:extLst>
           </p:cNvPr>
@@ -2957,7 +2957,7 @@
           <p:cNvPr id="12" name="Rectangle 11">
             <a:extLst>
               <a:ext uri="{FF2B5EF4-FFF2-40B4-BE49-F238E27FC236}">
-                <a16:creationId xmlns:a16="http://schemas.microsoft.com/office/drawing/2014/main" id="{8EDB9AD5-132F-E67B-8206-D26C1F667C82}"/>
+                <a16:creationId xmlns:a16="http://schemas.microsoft.com/office/drawing/2014/main" xmlns="" id="{8EDB9AD5-132F-E67B-8206-D26C1F667C82}"/>
               </a:ext>
             </a:extLst>
           </p:cNvPr>
@@ -3014,7 +3014,7 @@
           <p:cNvPr id="14" name="Picture 13" descr="Logo&#10;&#10;Description automatically generated">
             <a:extLst>
               <a:ext uri="{FF2B5EF4-FFF2-40B4-BE49-F238E27FC236}">
-                <a16:creationId xmlns:a16="http://schemas.microsoft.com/office/drawing/2014/main" id="{AF901998-0B96-05CE-E641-81D84F4F4D49}"/>
+                <a16:creationId xmlns:a16="http://schemas.microsoft.com/office/drawing/2014/main" xmlns="" id="{AF901998-0B96-05CE-E641-81D84F4F4D49}"/>
               </a:ext>
             </a:extLst>
           </p:cNvPr>
@@ -3080,7 +3080,7 @@
           <p:cNvPr id="3" name="Subtitle 2">
             <a:extLst>
               <a:ext uri="{FF2B5EF4-FFF2-40B4-BE49-F238E27FC236}">
-                <a16:creationId xmlns:a16="http://schemas.microsoft.com/office/drawing/2014/main" id="{476B5B34-7AB2-8B19-2254-C3D9E8FBA6BA}"/>
+                <a16:creationId xmlns:a16="http://schemas.microsoft.com/office/drawing/2014/main" xmlns="" id="{476B5B34-7AB2-8B19-2254-C3D9E8FBA6BA}"/>
               </a:ext>
             </a:extLst>
           </p:cNvPr>
@@ -3225,7 +3225,7 @@
           <p:cNvPr id="4" name="Picture 3" descr="Logo&#10;&#10;Description automatically generated">
             <a:extLst>
               <a:ext uri="{FF2B5EF4-FFF2-40B4-BE49-F238E27FC236}">
-                <a16:creationId xmlns:a16="http://schemas.microsoft.com/office/drawing/2014/main" id="{28A05A6E-AB93-28D6-45BA-C2A7DE8ACA0C}"/>
+                <a16:creationId xmlns:a16="http://schemas.microsoft.com/office/drawing/2014/main" xmlns="" id="{28A05A6E-AB93-28D6-45BA-C2A7DE8ACA0C}"/>
               </a:ext>
             </a:extLst>
           </p:cNvPr>
@@ -3261,7 +3261,7 @@
           <p:cNvPr id="5" name="Rectangle 4">
             <a:extLst>
               <a:ext uri="{FF2B5EF4-FFF2-40B4-BE49-F238E27FC236}">
-                <a16:creationId xmlns:a16="http://schemas.microsoft.com/office/drawing/2014/main" id="{65753E25-84F9-6E3D-5410-1B6DA7A49A5B}"/>
+                <a16:creationId xmlns:a16="http://schemas.microsoft.com/office/drawing/2014/main" xmlns="" id="{65753E25-84F9-6E3D-5410-1B6DA7A49A5B}"/>
               </a:ext>
             </a:extLst>
           </p:cNvPr>
@@ -3348,7 +3348,7 @@
           <p:cNvPr id="3" name="Subtitle 2">
             <a:extLst>
               <a:ext uri="{FF2B5EF4-FFF2-40B4-BE49-F238E27FC236}">
-                <a16:creationId xmlns:a16="http://schemas.microsoft.com/office/drawing/2014/main" id="{476B5B34-7AB2-8B19-2254-C3D9E8FBA6BA}"/>
+                <a16:creationId xmlns:a16="http://schemas.microsoft.com/office/drawing/2014/main" xmlns="" id="{476B5B34-7AB2-8B19-2254-C3D9E8FBA6BA}"/>
               </a:ext>
             </a:extLst>
           </p:cNvPr>
@@ -3455,7 +3455,7 @@
           <p:cNvPr id="4" name="Picture 3" descr="Logo&#10;&#10;Description automatically generated">
             <a:extLst>
               <a:ext uri="{FF2B5EF4-FFF2-40B4-BE49-F238E27FC236}">
-                <a16:creationId xmlns:a16="http://schemas.microsoft.com/office/drawing/2014/main" id="{28A05A6E-AB93-28D6-45BA-C2A7DE8ACA0C}"/>
+                <a16:creationId xmlns:a16="http://schemas.microsoft.com/office/drawing/2014/main" xmlns="" id="{28A05A6E-AB93-28D6-45BA-C2A7DE8ACA0C}"/>
               </a:ext>
             </a:extLst>
           </p:cNvPr>
@@ -3491,7 +3491,7 @@
           <p:cNvPr id="5" name="Rectangle 4">
             <a:extLst>
               <a:ext uri="{FF2B5EF4-FFF2-40B4-BE49-F238E27FC236}">
-                <a16:creationId xmlns:a16="http://schemas.microsoft.com/office/drawing/2014/main" id="{65753E25-84F9-6E3D-5410-1B6DA7A49A5B}"/>
+                <a16:creationId xmlns:a16="http://schemas.microsoft.com/office/drawing/2014/main" xmlns="" id="{65753E25-84F9-6E3D-5410-1B6DA7A49A5B}"/>
               </a:ext>
             </a:extLst>
           </p:cNvPr>
@@ -3578,7 +3578,7 @@
           <p:cNvPr id="3" name="Subtitle 2">
             <a:extLst>
               <a:ext uri="{FF2B5EF4-FFF2-40B4-BE49-F238E27FC236}">
-                <a16:creationId xmlns:a16="http://schemas.microsoft.com/office/drawing/2014/main" id="{476B5B34-7AB2-8B19-2254-C3D9E8FBA6BA}"/>
+                <a16:creationId xmlns:a16="http://schemas.microsoft.com/office/drawing/2014/main" xmlns="" id="{476B5B34-7AB2-8B19-2254-C3D9E8FBA6BA}"/>
               </a:ext>
             </a:extLst>
           </p:cNvPr>
@@ -3657,7 +3657,7 @@
           <p:cNvPr id="4" name="Picture 3" descr="Logo&#10;&#10;Description automatically generated">
             <a:extLst>
               <a:ext uri="{FF2B5EF4-FFF2-40B4-BE49-F238E27FC236}">
-                <a16:creationId xmlns:a16="http://schemas.microsoft.com/office/drawing/2014/main" id="{28A05A6E-AB93-28D6-45BA-C2A7DE8ACA0C}"/>
+                <a16:creationId xmlns:a16="http://schemas.microsoft.com/office/drawing/2014/main" xmlns="" id="{28A05A6E-AB93-28D6-45BA-C2A7DE8ACA0C}"/>
               </a:ext>
             </a:extLst>
           </p:cNvPr>
@@ -3693,7 +3693,7 @@
           <p:cNvPr id="5" name="Rectangle 4">
             <a:extLst>
               <a:ext uri="{FF2B5EF4-FFF2-40B4-BE49-F238E27FC236}">
-                <a16:creationId xmlns:a16="http://schemas.microsoft.com/office/drawing/2014/main" id="{65753E25-84F9-6E3D-5410-1B6DA7A49A5B}"/>
+                <a16:creationId xmlns:a16="http://schemas.microsoft.com/office/drawing/2014/main" xmlns="" id="{65753E25-84F9-6E3D-5410-1B6DA7A49A5B}"/>
               </a:ext>
             </a:extLst>
           </p:cNvPr>
@@ -3780,7 +3780,7 @@
           <p:cNvPr id="3" name="Subtitle 2">
             <a:extLst>
               <a:ext uri="{FF2B5EF4-FFF2-40B4-BE49-F238E27FC236}">
-                <a16:creationId xmlns:a16="http://schemas.microsoft.com/office/drawing/2014/main" id="{476B5B34-7AB2-8B19-2254-C3D9E8FBA6BA}"/>
+                <a16:creationId xmlns:a16="http://schemas.microsoft.com/office/drawing/2014/main" xmlns="" id="{476B5B34-7AB2-8B19-2254-C3D9E8FBA6BA}"/>
               </a:ext>
             </a:extLst>
           </p:cNvPr>
@@ -3924,14 +3924,18 @@
             </a:r>
             <a:r>
               <a:rPr lang="en-IN" dirty="0"/>
-              <a:t> error = new </a:t>
-            </a:r>
-            <a:r>
-              <a:rPr lang="en-IN" dirty="0" err="1"/>
+              <a:t> </a:t>
+            </a:r>
+            <a:r>
+              <a:rPr lang="en-IN" u="sng" dirty="0"/>
+              <a:t>error = new </a:t>
+            </a:r>
+            <a:r>
+              <a:rPr lang="en-IN" u="sng" dirty="0" err="1"/>
               <a:t>ErrorResponse</a:t>
             </a:r>
             <a:r>
-              <a:rPr lang="en-IN" dirty="0"/>
+              <a:rPr lang="en-IN" u="sng" dirty="0"/>
               <a:t>();</a:t>
             </a:r>
           </a:p>
@@ -3941,23 +3945,23 @@
               <a:buAutoNum type="arabicPeriod"/>
             </a:pPr>
             <a:r>
-              <a:rPr lang="en-IN" dirty="0"/>
+              <a:rPr lang="en-IN" u="sng" dirty="0"/>
               <a:t>        </a:t>
             </a:r>
             <a:r>
-              <a:rPr lang="en-IN" dirty="0" err="1"/>
+              <a:rPr lang="en-IN" u="sng" dirty="0" err="1"/>
               <a:t>error.setMessage</a:t>
             </a:r>
             <a:r>
-              <a:rPr lang="en-IN" dirty="0"/>
+              <a:rPr lang="en-IN" u="sng" dirty="0"/>
               <a:t>(</a:t>
             </a:r>
             <a:r>
-              <a:rPr lang="en-IN" dirty="0" err="1"/>
+              <a:rPr lang="en-IN" u="sng" dirty="0" err="1"/>
               <a:t>e.getMessage</a:t>
             </a:r>
             <a:r>
-              <a:rPr lang="en-IN" dirty="0"/>
+              <a:rPr lang="en-IN" u="sng" dirty="0"/>
               <a:t>());</a:t>
             </a:r>
           </a:p>
@@ -3967,19 +3971,19 @@
               <a:buAutoNum type="arabicPeriod"/>
             </a:pPr>
             <a:r>
-              <a:rPr lang="en-IN" dirty="0"/>
+              <a:rPr lang="en-IN" u="sng" dirty="0"/>
               <a:t>        </a:t>
             </a:r>
             <a:r>
-              <a:rPr lang="en-IN" dirty="0" err="1"/>
+              <a:rPr lang="en-IN" u="sng" dirty="0" err="1"/>
               <a:t>error.setStatus</a:t>
             </a:r>
             <a:r>
-              <a:rPr lang="en-IN" dirty="0"/>
+              <a:rPr lang="en-IN" u="sng" dirty="0"/>
               <a:t>(</a:t>
             </a:r>
             <a:r>
-              <a:rPr lang="en-IN" dirty="0" err="1"/>
+              <a:rPr lang="en-IN" u="sng" dirty="0" err="1"/>
               <a:t>HttpStatus.INTERNAL_SERVER_ERROR.value</a:t>
             </a:r>
             <a:r>
@@ -4044,7 +4048,7 @@
           <p:cNvPr id="4" name="Picture 3" descr="Logo&#10;&#10;Description automatically generated">
             <a:extLst>
               <a:ext uri="{FF2B5EF4-FFF2-40B4-BE49-F238E27FC236}">
-                <a16:creationId xmlns:a16="http://schemas.microsoft.com/office/drawing/2014/main" id="{28A05A6E-AB93-28D6-45BA-C2A7DE8ACA0C}"/>
+                <a16:creationId xmlns:a16="http://schemas.microsoft.com/office/drawing/2014/main" xmlns="" id="{28A05A6E-AB93-28D6-45BA-C2A7DE8ACA0C}"/>
               </a:ext>
             </a:extLst>
           </p:cNvPr>
@@ -4080,7 +4084,7 @@
           <p:cNvPr id="5" name="Rectangle 4">
             <a:extLst>
               <a:ext uri="{FF2B5EF4-FFF2-40B4-BE49-F238E27FC236}">
-                <a16:creationId xmlns:a16="http://schemas.microsoft.com/office/drawing/2014/main" id="{65753E25-84F9-6E3D-5410-1B6DA7A49A5B}"/>
+                <a16:creationId xmlns:a16="http://schemas.microsoft.com/office/drawing/2014/main" xmlns="" id="{65753E25-84F9-6E3D-5410-1B6DA7A49A5B}"/>
               </a:ext>
             </a:extLst>
           </p:cNvPr>
@@ -4167,7 +4171,7 @@
           <p:cNvPr id="3" name="Subtitle 2">
             <a:extLst>
               <a:ext uri="{FF2B5EF4-FFF2-40B4-BE49-F238E27FC236}">
-                <a16:creationId xmlns:a16="http://schemas.microsoft.com/office/drawing/2014/main" id="{476B5B34-7AB2-8B19-2254-C3D9E8FBA6BA}"/>
+                <a16:creationId xmlns:a16="http://schemas.microsoft.com/office/drawing/2014/main" xmlns="" id="{476B5B34-7AB2-8B19-2254-C3D9E8FBA6BA}"/>
               </a:ext>
             </a:extLst>
           </p:cNvPr>
@@ -4334,7 +4338,7 @@
           <p:cNvPr id="4" name="Picture 3" descr="Logo&#10;&#10;Description automatically generated">
             <a:extLst>
               <a:ext uri="{FF2B5EF4-FFF2-40B4-BE49-F238E27FC236}">
-                <a16:creationId xmlns:a16="http://schemas.microsoft.com/office/drawing/2014/main" id="{28A05A6E-AB93-28D6-45BA-C2A7DE8ACA0C}"/>
+                <a16:creationId xmlns:a16="http://schemas.microsoft.com/office/drawing/2014/main" xmlns="" id="{28A05A6E-AB93-28D6-45BA-C2A7DE8ACA0C}"/>
               </a:ext>
             </a:extLst>
           </p:cNvPr>
@@ -4370,7 +4374,7 @@
           <p:cNvPr id="5" name="Rectangle 4">
             <a:extLst>
               <a:ext uri="{FF2B5EF4-FFF2-40B4-BE49-F238E27FC236}">
-                <a16:creationId xmlns:a16="http://schemas.microsoft.com/office/drawing/2014/main" id="{65753E25-84F9-6E3D-5410-1B6DA7A49A5B}"/>
+                <a16:creationId xmlns:a16="http://schemas.microsoft.com/office/drawing/2014/main" xmlns="" id="{65753E25-84F9-6E3D-5410-1B6DA7A49A5B}"/>
               </a:ext>
             </a:extLst>
           </p:cNvPr>
@@ -4457,7 +4461,7 @@
           <p:cNvPr id="3" name="Subtitle 2">
             <a:extLst>
               <a:ext uri="{FF2B5EF4-FFF2-40B4-BE49-F238E27FC236}">
-                <a16:creationId xmlns:a16="http://schemas.microsoft.com/office/drawing/2014/main" id="{476B5B34-7AB2-8B19-2254-C3D9E8FBA6BA}"/>
+                <a16:creationId xmlns:a16="http://schemas.microsoft.com/office/drawing/2014/main" xmlns="" id="{476B5B34-7AB2-8B19-2254-C3D9E8FBA6BA}"/>
               </a:ext>
             </a:extLst>
           </p:cNvPr>
@@ -4575,7 +4579,7 @@
           <p:cNvPr id="4" name="Picture 3" descr="Logo&#10;&#10;Description automatically generated">
             <a:extLst>
               <a:ext uri="{FF2B5EF4-FFF2-40B4-BE49-F238E27FC236}">
-                <a16:creationId xmlns:a16="http://schemas.microsoft.com/office/drawing/2014/main" id="{28A05A6E-AB93-28D6-45BA-C2A7DE8ACA0C}"/>
+                <a16:creationId xmlns:a16="http://schemas.microsoft.com/office/drawing/2014/main" xmlns="" id="{28A05A6E-AB93-28D6-45BA-C2A7DE8ACA0C}"/>
               </a:ext>
             </a:extLst>
           </p:cNvPr>
@@ -4611,7 +4615,7 @@
           <p:cNvPr id="5" name="Rectangle 4">
             <a:extLst>
               <a:ext uri="{FF2B5EF4-FFF2-40B4-BE49-F238E27FC236}">
-                <a16:creationId xmlns:a16="http://schemas.microsoft.com/office/drawing/2014/main" id="{65753E25-84F9-6E3D-5410-1B6DA7A49A5B}"/>
+                <a16:creationId xmlns:a16="http://schemas.microsoft.com/office/drawing/2014/main" xmlns="" id="{65753E25-84F9-6E3D-5410-1B6DA7A49A5B}"/>
               </a:ext>
             </a:extLst>
           </p:cNvPr>
@@ -4698,7 +4702,7 @@
           <p:cNvPr id="3" name="Subtitle 2">
             <a:extLst>
               <a:ext uri="{FF2B5EF4-FFF2-40B4-BE49-F238E27FC236}">
-                <a16:creationId xmlns:a16="http://schemas.microsoft.com/office/drawing/2014/main" id="{476B5B34-7AB2-8B19-2254-C3D9E8FBA6BA}"/>
+                <a16:creationId xmlns:a16="http://schemas.microsoft.com/office/drawing/2014/main" xmlns="" id="{476B5B34-7AB2-8B19-2254-C3D9E8FBA6BA}"/>
               </a:ext>
             </a:extLst>
           </p:cNvPr>
@@ -4801,7 +4805,7 @@
           <p:cNvPr id="4" name="Picture 3" descr="Logo&#10;&#10;Description automatically generated">
             <a:extLst>
               <a:ext uri="{FF2B5EF4-FFF2-40B4-BE49-F238E27FC236}">
-                <a16:creationId xmlns:a16="http://schemas.microsoft.com/office/drawing/2014/main" id="{28A05A6E-AB93-28D6-45BA-C2A7DE8ACA0C}"/>
+                <a16:creationId xmlns:a16="http://schemas.microsoft.com/office/drawing/2014/main" xmlns="" id="{28A05A6E-AB93-28D6-45BA-C2A7DE8ACA0C}"/>
               </a:ext>
             </a:extLst>
           </p:cNvPr>
@@ -4837,7 +4841,7 @@
           <p:cNvPr id="5" name="Rectangle 4">
             <a:extLst>
               <a:ext uri="{FF2B5EF4-FFF2-40B4-BE49-F238E27FC236}">
-                <a16:creationId xmlns:a16="http://schemas.microsoft.com/office/drawing/2014/main" id="{65753E25-84F9-6E3D-5410-1B6DA7A49A5B}"/>
+                <a16:creationId xmlns:a16="http://schemas.microsoft.com/office/drawing/2014/main" xmlns="" id="{65753E25-84F9-6E3D-5410-1B6DA7A49A5B}"/>
               </a:ext>
             </a:extLst>
           </p:cNvPr>
@@ -4924,7 +4928,7 @@
           <p:cNvPr id="3" name="Subtitle 2">
             <a:extLst>
               <a:ext uri="{FF2B5EF4-FFF2-40B4-BE49-F238E27FC236}">
-                <a16:creationId xmlns:a16="http://schemas.microsoft.com/office/drawing/2014/main" id="{476B5B34-7AB2-8B19-2254-C3D9E8FBA6BA}"/>
+                <a16:creationId xmlns:a16="http://schemas.microsoft.com/office/drawing/2014/main" xmlns="" id="{476B5B34-7AB2-8B19-2254-C3D9E8FBA6BA}"/>
               </a:ext>
             </a:extLst>
           </p:cNvPr>
@@ -5019,7 +5023,7 @@
           <p:cNvPr id="4" name="Picture 3" descr="Logo&#10;&#10;Description automatically generated">
             <a:extLst>
               <a:ext uri="{FF2B5EF4-FFF2-40B4-BE49-F238E27FC236}">
-                <a16:creationId xmlns:a16="http://schemas.microsoft.com/office/drawing/2014/main" id="{28A05A6E-AB93-28D6-45BA-C2A7DE8ACA0C}"/>
+                <a16:creationId xmlns:a16="http://schemas.microsoft.com/office/drawing/2014/main" xmlns="" id="{28A05A6E-AB93-28D6-45BA-C2A7DE8ACA0C}"/>
               </a:ext>
             </a:extLst>
           </p:cNvPr>
@@ -5055,7 +5059,7 @@
           <p:cNvPr id="5" name="Rectangle 4">
             <a:extLst>
               <a:ext uri="{FF2B5EF4-FFF2-40B4-BE49-F238E27FC236}">
-                <a16:creationId xmlns:a16="http://schemas.microsoft.com/office/drawing/2014/main" id="{65753E25-84F9-6E3D-5410-1B6DA7A49A5B}"/>
+                <a16:creationId xmlns:a16="http://schemas.microsoft.com/office/drawing/2014/main" xmlns="" id="{65753E25-84F9-6E3D-5410-1B6DA7A49A5B}"/>
               </a:ext>
             </a:extLst>
           </p:cNvPr>
@@ -5142,7 +5146,7 @@
           <p:cNvPr id="3" name="Subtitle 2">
             <a:extLst>
               <a:ext uri="{FF2B5EF4-FFF2-40B4-BE49-F238E27FC236}">
-                <a16:creationId xmlns:a16="http://schemas.microsoft.com/office/drawing/2014/main" id="{476B5B34-7AB2-8B19-2254-C3D9E8FBA6BA}"/>
+                <a16:creationId xmlns:a16="http://schemas.microsoft.com/office/drawing/2014/main" xmlns="" id="{476B5B34-7AB2-8B19-2254-C3D9E8FBA6BA}"/>
               </a:ext>
             </a:extLst>
           </p:cNvPr>
@@ -5283,7 +5287,7 @@
           <p:cNvPr id="4" name="Picture 3" descr="Logo&#10;&#10;Description automatically generated">
             <a:extLst>
               <a:ext uri="{FF2B5EF4-FFF2-40B4-BE49-F238E27FC236}">
-                <a16:creationId xmlns:a16="http://schemas.microsoft.com/office/drawing/2014/main" id="{28A05A6E-AB93-28D6-45BA-C2A7DE8ACA0C}"/>
+                <a16:creationId xmlns:a16="http://schemas.microsoft.com/office/drawing/2014/main" xmlns="" id="{28A05A6E-AB93-28D6-45BA-C2A7DE8ACA0C}"/>
               </a:ext>
             </a:extLst>
           </p:cNvPr>
@@ -5319,7 +5323,7 @@
           <p:cNvPr id="5" name="Rectangle 4">
             <a:extLst>
               <a:ext uri="{FF2B5EF4-FFF2-40B4-BE49-F238E27FC236}">
-                <a16:creationId xmlns:a16="http://schemas.microsoft.com/office/drawing/2014/main" id="{65753E25-84F9-6E3D-5410-1B6DA7A49A5B}"/>
+                <a16:creationId xmlns:a16="http://schemas.microsoft.com/office/drawing/2014/main" xmlns="" id="{65753E25-84F9-6E3D-5410-1B6DA7A49A5B}"/>
               </a:ext>
             </a:extLst>
           </p:cNvPr>
@@ -5406,7 +5410,7 @@
           <p:cNvPr id="3" name="Subtitle 2">
             <a:extLst>
               <a:ext uri="{FF2B5EF4-FFF2-40B4-BE49-F238E27FC236}">
-                <a16:creationId xmlns:a16="http://schemas.microsoft.com/office/drawing/2014/main" id="{476B5B34-7AB2-8B19-2254-C3D9E8FBA6BA}"/>
+                <a16:creationId xmlns:a16="http://schemas.microsoft.com/office/drawing/2014/main" xmlns="" id="{476B5B34-7AB2-8B19-2254-C3D9E8FBA6BA}"/>
               </a:ext>
             </a:extLst>
           </p:cNvPr>
@@ -5535,7 +5539,7 @@
           <p:cNvPr id="4" name="Picture 3" descr="Logo&#10;&#10;Description automatically generated">
             <a:extLst>
               <a:ext uri="{FF2B5EF4-FFF2-40B4-BE49-F238E27FC236}">
-                <a16:creationId xmlns:a16="http://schemas.microsoft.com/office/drawing/2014/main" id="{28A05A6E-AB93-28D6-45BA-C2A7DE8ACA0C}"/>
+                <a16:creationId xmlns:a16="http://schemas.microsoft.com/office/drawing/2014/main" xmlns="" id="{28A05A6E-AB93-28D6-45BA-C2A7DE8ACA0C}"/>
               </a:ext>
             </a:extLst>
           </p:cNvPr>
@@ -5571,7 +5575,7 @@
           <p:cNvPr id="5" name="Rectangle 4">
             <a:extLst>
               <a:ext uri="{FF2B5EF4-FFF2-40B4-BE49-F238E27FC236}">
-                <a16:creationId xmlns:a16="http://schemas.microsoft.com/office/drawing/2014/main" id="{65753E25-84F9-6E3D-5410-1B6DA7A49A5B}"/>
+                <a16:creationId xmlns:a16="http://schemas.microsoft.com/office/drawing/2014/main" xmlns="" id="{65753E25-84F9-6E3D-5410-1B6DA7A49A5B}"/>
               </a:ext>
             </a:extLst>
           </p:cNvPr>
@@ -5658,7 +5662,7 @@
           <p:cNvPr id="3" name="Subtitle 2">
             <a:extLst>
               <a:ext uri="{FF2B5EF4-FFF2-40B4-BE49-F238E27FC236}">
-                <a16:creationId xmlns:a16="http://schemas.microsoft.com/office/drawing/2014/main" id="{476B5B34-7AB2-8B19-2254-C3D9E8FBA6BA}"/>
+                <a16:creationId xmlns:a16="http://schemas.microsoft.com/office/drawing/2014/main" xmlns="" id="{476B5B34-7AB2-8B19-2254-C3D9E8FBA6BA}"/>
               </a:ext>
             </a:extLst>
           </p:cNvPr>
@@ -5765,7 +5769,7 @@
           <p:cNvPr id="4" name="Picture 3" descr="Logo&#10;&#10;Description automatically generated">
             <a:extLst>
               <a:ext uri="{FF2B5EF4-FFF2-40B4-BE49-F238E27FC236}">
-                <a16:creationId xmlns:a16="http://schemas.microsoft.com/office/drawing/2014/main" id="{28A05A6E-AB93-28D6-45BA-C2A7DE8ACA0C}"/>
+                <a16:creationId xmlns:a16="http://schemas.microsoft.com/office/drawing/2014/main" xmlns="" id="{28A05A6E-AB93-28D6-45BA-C2A7DE8ACA0C}"/>
               </a:ext>
             </a:extLst>
           </p:cNvPr>
@@ -5801,7 +5805,7 @@
           <p:cNvPr id="5" name="Rectangle 4">
             <a:extLst>
               <a:ext uri="{FF2B5EF4-FFF2-40B4-BE49-F238E27FC236}">
-                <a16:creationId xmlns:a16="http://schemas.microsoft.com/office/drawing/2014/main" id="{65753E25-84F9-6E3D-5410-1B6DA7A49A5B}"/>
+                <a16:creationId xmlns:a16="http://schemas.microsoft.com/office/drawing/2014/main" xmlns="" id="{65753E25-84F9-6E3D-5410-1B6DA7A49A5B}"/>
               </a:ext>
             </a:extLst>
           </p:cNvPr>
@@ -5888,7 +5892,7 @@
           <p:cNvPr id="3" name="Subtitle 2">
             <a:extLst>
               <a:ext uri="{FF2B5EF4-FFF2-40B4-BE49-F238E27FC236}">
-                <a16:creationId xmlns:a16="http://schemas.microsoft.com/office/drawing/2014/main" id="{476B5B34-7AB2-8B19-2254-C3D9E8FBA6BA}"/>
+                <a16:creationId xmlns:a16="http://schemas.microsoft.com/office/drawing/2014/main" xmlns="" id="{476B5B34-7AB2-8B19-2254-C3D9E8FBA6BA}"/>
               </a:ext>
             </a:extLst>
           </p:cNvPr>
@@ -5979,7 +5983,7 @@
           <p:cNvPr id="4" name="Picture 3" descr="Logo&#10;&#10;Description automatically generated">
             <a:extLst>
               <a:ext uri="{FF2B5EF4-FFF2-40B4-BE49-F238E27FC236}">
-                <a16:creationId xmlns:a16="http://schemas.microsoft.com/office/drawing/2014/main" id="{28A05A6E-AB93-28D6-45BA-C2A7DE8ACA0C}"/>
+                <a16:creationId xmlns:a16="http://schemas.microsoft.com/office/drawing/2014/main" xmlns="" id="{28A05A6E-AB93-28D6-45BA-C2A7DE8ACA0C}"/>
               </a:ext>
             </a:extLst>
           </p:cNvPr>
@@ -6015,7 +6019,7 @@
           <p:cNvPr id="5" name="Rectangle 4">
             <a:extLst>
               <a:ext uri="{FF2B5EF4-FFF2-40B4-BE49-F238E27FC236}">
-                <a16:creationId xmlns:a16="http://schemas.microsoft.com/office/drawing/2014/main" id="{65753E25-84F9-6E3D-5410-1B6DA7A49A5B}"/>
+                <a16:creationId xmlns:a16="http://schemas.microsoft.com/office/drawing/2014/main" xmlns="" id="{65753E25-84F9-6E3D-5410-1B6DA7A49A5B}"/>
               </a:ext>
             </a:extLst>
           </p:cNvPr>
@@ -6102,7 +6106,7 @@
           <p:cNvPr id="3" name="Subtitle 2">
             <a:extLst>
               <a:ext uri="{FF2B5EF4-FFF2-40B4-BE49-F238E27FC236}">
-                <a16:creationId xmlns:a16="http://schemas.microsoft.com/office/drawing/2014/main" id="{476B5B34-7AB2-8B19-2254-C3D9E8FBA6BA}"/>
+                <a16:creationId xmlns:a16="http://schemas.microsoft.com/office/drawing/2014/main" xmlns="" id="{476B5B34-7AB2-8B19-2254-C3D9E8FBA6BA}"/>
               </a:ext>
             </a:extLst>
           </p:cNvPr>
@@ -6279,7 +6283,7 @@
           <p:cNvPr id="4" name="Picture 3" descr="Logo&#10;&#10;Description automatically generated">
             <a:extLst>
               <a:ext uri="{FF2B5EF4-FFF2-40B4-BE49-F238E27FC236}">
-                <a16:creationId xmlns:a16="http://schemas.microsoft.com/office/drawing/2014/main" id="{28A05A6E-AB93-28D6-45BA-C2A7DE8ACA0C}"/>
+                <a16:creationId xmlns:a16="http://schemas.microsoft.com/office/drawing/2014/main" xmlns="" id="{28A05A6E-AB93-28D6-45BA-C2A7DE8ACA0C}"/>
               </a:ext>
             </a:extLst>
           </p:cNvPr>
@@ -6315,7 +6319,7 @@
           <p:cNvPr id="5" name="Rectangle 4">
             <a:extLst>
               <a:ext uri="{FF2B5EF4-FFF2-40B4-BE49-F238E27FC236}">
-                <a16:creationId xmlns:a16="http://schemas.microsoft.com/office/drawing/2014/main" id="{65753E25-84F9-6E3D-5410-1B6DA7A49A5B}"/>
+                <a16:creationId xmlns:a16="http://schemas.microsoft.com/office/drawing/2014/main" xmlns="" id="{65753E25-84F9-6E3D-5410-1B6DA7A49A5B}"/>
               </a:ext>
             </a:extLst>
           </p:cNvPr>
@@ -6402,7 +6406,7 @@
           <p:cNvPr id="3" name="Subtitle 2">
             <a:extLst>
               <a:ext uri="{FF2B5EF4-FFF2-40B4-BE49-F238E27FC236}">
-                <a16:creationId xmlns:a16="http://schemas.microsoft.com/office/drawing/2014/main" id="{476B5B34-7AB2-8B19-2254-C3D9E8FBA6BA}"/>
+                <a16:creationId xmlns:a16="http://schemas.microsoft.com/office/drawing/2014/main" xmlns="" id="{476B5B34-7AB2-8B19-2254-C3D9E8FBA6BA}"/>
               </a:ext>
             </a:extLst>
           </p:cNvPr>
@@ -6582,7 +6586,7 @@
           <p:cNvPr id="4" name="Picture 3" descr="Logo&#10;&#10;Description automatically generated">
             <a:extLst>
               <a:ext uri="{FF2B5EF4-FFF2-40B4-BE49-F238E27FC236}">
-                <a16:creationId xmlns:a16="http://schemas.microsoft.com/office/drawing/2014/main" id="{28A05A6E-AB93-28D6-45BA-C2A7DE8ACA0C}"/>
+                <a16:creationId xmlns:a16="http://schemas.microsoft.com/office/drawing/2014/main" xmlns="" id="{28A05A6E-AB93-28D6-45BA-C2A7DE8ACA0C}"/>
               </a:ext>
             </a:extLst>
           </p:cNvPr>
@@ -6618,7 +6622,7 @@
           <p:cNvPr id="5" name="Rectangle 4">
             <a:extLst>
               <a:ext uri="{FF2B5EF4-FFF2-40B4-BE49-F238E27FC236}">
-                <a16:creationId xmlns:a16="http://schemas.microsoft.com/office/drawing/2014/main" id="{65753E25-84F9-6E3D-5410-1B6DA7A49A5B}"/>
+                <a16:creationId xmlns:a16="http://schemas.microsoft.com/office/drawing/2014/main" xmlns="" id="{65753E25-84F9-6E3D-5410-1B6DA7A49A5B}"/>
               </a:ext>
             </a:extLst>
           </p:cNvPr>
@@ -6705,7 +6709,7 @@
           <p:cNvPr id="3" name="Subtitle 2">
             <a:extLst>
               <a:ext uri="{FF2B5EF4-FFF2-40B4-BE49-F238E27FC236}">
-                <a16:creationId xmlns:a16="http://schemas.microsoft.com/office/drawing/2014/main" id="{476B5B34-7AB2-8B19-2254-C3D9E8FBA6BA}"/>
+                <a16:creationId xmlns:a16="http://schemas.microsoft.com/office/drawing/2014/main" xmlns="" id="{476B5B34-7AB2-8B19-2254-C3D9E8FBA6BA}"/>
               </a:ext>
             </a:extLst>
           </p:cNvPr>
@@ -6823,7 +6827,7 @@
           <p:cNvPr id="4" name="Picture 3" descr="Logo&#10;&#10;Description automatically generated">
             <a:extLst>
               <a:ext uri="{FF2B5EF4-FFF2-40B4-BE49-F238E27FC236}">
-                <a16:creationId xmlns:a16="http://schemas.microsoft.com/office/drawing/2014/main" id="{28A05A6E-AB93-28D6-45BA-C2A7DE8ACA0C}"/>
+                <a16:creationId xmlns:a16="http://schemas.microsoft.com/office/drawing/2014/main" xmlns="" id="{28A05A6E-AB93-28D6-45BA-C2A7DE8ACA0C}"/>
               </a:ext>
             </a:extLst>
           </p:cNvPr>
@@ -6859,7 +6863,7 @@
           <p:cNvPr id="5" name="Rectangle 4">
             <a:extLst>
               <a:ext uri="{FF2B5EF4-FFF2-40B4-BE49-F238E27FC236}">
-                <a16:creationId xmlns:a16="http://schemas.microsoft.com/office/drawing/2014/main" id="{65753E25-84F9-6E3D-5410-1B6DA7A49A5B}"/>
+                <a16:creationId xmlns:a16="http://schemas.microsoft.com/office/drawing/2014/main" xmlns="" id="{65753E25-84F9-6E3D-5410-1B6DA7A49A5B}"/>
               </a:ext>
             </a:extLst>
           </p:cNvPr>
@@ -6946,7 +6950,7 @@
           <p:cNvPr id="3" name="Subtitle 2">
             <a:extLst>
               <a:ext uri="{FF2B5EF4-FFF2-40B4-BE49-F238E27FC236}">
-                <a16:creationId xmlns:a16="http://schemas.microsoft.com/office/drawing/2014/main" id="{476B5B34-7AB2-8B19-2254-C3D9E8FBA6BA}"/>
+                <a16:creationId xmlns:a16="http://schemas.microsoft.com/office/drawing/2014/main" xmlns="" id="{476B5B34-7AB2-8B19-2254-C3D9E8FBA6BA}"/>
               </a:ext>
             </a:extLst>
           </p:cNvPr>
@@ -7032,7 +7036,7 @@
           <p:cNvPr id="4" name="Picture 3" descr="Logo&#10;&#10;Description automatically generated">
             <a:extLst>
               <a:ext uri="{FF2B5EF4-FFF2-40B4-BE49-F238E27FC236}">
-                <a16:creationId xmlns:a16="http://schemas.microsoft.com/office/drawing/2014/main" id="{28A05A6E-AB93-28D6-45BA-C2A7DE8ACA0C}"/>
+                <a16:creationId xmlns:a16="http://schemas.microsoft.com/office/drawing/2014/main" xmlns="" id="{28A05A6E-AB93-28D6-45BA-C2A7DE8ACA0C}"/>
               </a:ext>
             </a:extLst>
           </p:cNvPr>
@@ -7068,7 +7072,7 @@
           <p:cNvPr id="5" name="Rectangle 4">
             <a:extLst>
               <a:ext uri="{FF2B5EF4-FFF2-40B4-BE49-F238E27FC236}">
-                <a16:creationId xmlns:a16="http://schemas.microsoft.com/office/drawing/2014/main" id="{65753E25-84F9-6E3D-5410-1B6DA7A49A5B}"/>
+                <a16:creationId xmlns:a16="http://schemas.microsoft.com/office/drawing/2014/main" xmlns="" id="{65753E25-84F9-6E3D-5410-1B6DA7A49A5B}"/>
               </a:ext>
             </a:extLst>
           </p:cNvPr>
@@ -7155,7 +7159,7 @@
           <p:cNvPr id="3" name="Subtitle 2">
             <a:extLst>
               <a:ext uri="{FF2B5EF4-FFF2-40B4-BE49-F238E27FC236}">
-                <a16:creationId xmlns:a16="http://schemas.microsoft.com/office/drawing/2014/main" id="{476B5B34-7AB2-8B19-2254-C3D9E8FBA6BA}"/>
+                <a16:creationId xmlns:a16="http://schemas.microsoft.com/office/drawing/2014/main" xmlns="" id="{476B5B34-7AB2-8B19-2254-C3D9E8FBA6BA}"/>
               </a:ext>
             </a:extLst>
           </p:cNvPr>
@@ -7417,7 +7421,7 @@
           <p:cNvPr id="4" name="Picture 3" descr="Logo&#10;&#10;Description automatically generated">
             <a:extLst>
               <a:ext uri="{FF2B5EF4-FFF2-40B4-BE49-F238E27FC236}">
-                <a16:creationId xmlns:a16="http://schemas.microsoft.com/office/drawing/2014/main" id="{28A05A6E-AB93-28D6-45BA-C2A7DE8ACA0C}"/>
+                <a16:creationId xmlns:a16="http://schemas.microsoft.com/office/drawing/2014/main" xmlns="" id="{28A05A6E-AB93-28D6-45BA-C2A7DE8ACA0C}"/>
               </a:ext>
             </a:extLst>
           </p:cNvPr>
@@ -7453,7 +7457,7 @@
           <p:cNvPr id="5" name="Rectangle 4">
             <a:extLst>
               <a:ext uri="{FF2B5EF4-FFF2-40B4-BE49-F238E27FC236}">
-                <a16:creationId xmlns:a16="http://schemas.microsoft.com/office/drawing/2014/main" id="{65753E25-84F9-6E3D-5410-1B6DA7A49A5B}"/>
+                <a16:creationId xmlns:a16="http://schemas.microsoft.com/office/drawing/2014/main" xmlns="" id="{65753E25-84F9-6E3D-5410-1B6DA7A49A5B}"/>
               </a:ext>
             </a:extLst>
           </p:cNvPr>
@@ -7540,7 +7544,7 @@
           <p:cNvPr id="3" name="Subtitle 2">
             <a:extLst>
               <a:ext uri="{FF2B5EF4-FFF2-40B4-BE49-F238E27FC236}">
-                <a16:creationId xmlns:a16="http://schemas.microsoft.com/office/drawing/2014/main" id="{476B5B34-7AB2-8B19-2254-C3D9E8FBA6BA}"/>
+                <a16:creationId xmlns:a16="http://schemas.microsoft.com/office/drawing/2014/main" xmlns="" id="{476B5B34-7AB2-8B19-2254-C3D9E8FBA6BA}"/>
               </a:ext>
             </a:extLst>
           </p:cNvPr>
@@ -7607,7 +7611,7 @@
           <p:cNvPr id="4" name="Picture 3" descr="Logo&#10;&#10;Description automatically generated">
             <a:extLst>
               <a:ext uri="{FF2B5EF4-FFF2-40B4-BE49-F238E27FC236}">
-                <a16:creationId xmlns:a16="http://schemas.microsoft.com/office/drawing/2014/main" id="{28A05A6E-AB93-28D6-45BA-C2A7DE8ACA0C}"/>
+                <a16:creationId xmlns:a16="http://schemas.microsoft.com/office/drawing/2014/main" xmlns="" id="{28A05A6E-AB93-28D6-45BA-C2A7DE8ACA0C}"/>
               </a:ext>
             </a:extLst>
           </p:cNvPr>
@@ -7643,7 +7647,7 @@
           <p:cNvPr id="5" name="Rectangle 4">
             <a:extLst>
               <a:ext uri="{FF2B5EF4-FFF2-40B4-BE49-F238E27FC236}">
-                <a16:creationId xmlns:a16="http://schemas.microsoft.com/office/drawing/2014/main" id="{65753E25-84F9-6E3D-5410-1B6DA7A49A5B}"/>
+                <a16:creationId xmlns:a16="http://schemas.microsoft.com/office/drawing/2014/main" xmlns="" id="{65753E25-84F9-6E3D-5410-1B6DA7A49A5B}"/>
               </a:ext>
             </a:extLst>
           </p:cNvPr>
@@ -7730,7 +7734,7 @@
           <p:cNvPr id="3" name="Subtitle 2">
             <a:extLst>
               <a:ext uri="{FF2B5EF4-FFF2-40B4-BE49-F238E27FC236}">
-                <a16:creationId xmlns:a16="http://schemas.microsoft.com/office/drawing/2014/main" id="{476B5B34-7AB2-8B19-2254-C3D9E8FBA6BA}"/>
+                <a16:creationId xmlns:a16="http://schemas.microsoft.com/office/drawing/2014/main" xmlns="" id="{476B5B34-7AB2-8B19-2254-C3D9E8FBA6BA}"/>
               </a:ext>
             </a:extLst>
           </p:cNvPr>
@@ -7770,7 +7774,7 @@
           <p:cNvPr id="4" name="Picture 3" descr="Logo&#10;&#10;Description automatically generated">
             <a:extLst>
               <a:ext uri="{FF2B5EF4-FFF2-40B4-BE49-F238E27FC236}">
-                <a16:creationId xmlns:a16="http://schemas.microsoft.com/office/drawing/2014/main" id="{28A05A6E-AB93-28D6-45BA-C2A7DE8ACA0C}"/>
+                <a16:creationId xmlns:a16="http://schemas.microsoft.com/office/drawing/2014/main" xmlns="" id="{28A05A6E-AB93-28D6-45BA-C2A7DE8ACA0C}"/>
               </a:ext>
             </a:extLst>
           </p:cNvPr>
@@ -7806,7 +7810,7 @@
           <p:cNvPr id="5" name="Rectangle 4">
             <a:extLst>
               <a:ext uri="{FF2B5EF4-FFF2-40B4-BE49-F238E27FC236}">
-                <a16:creationId xmlns:a16="http://schemas.microsoft.com/office/drawing/2014/main" id="{65753E25-84F9-6E3D-5410-1B6DA7A49A5B}"/>
+                <a16:creationId xmlns:a16="http://schemas.microsoft.com/office/drawing/2014/main" xmlns="" id="{65753E25-84F9-6E3D-5410-1B6DA7A49A5B}"/>
               </a:ext>
             </a:extLst>
           </p:cNvPr>
@@ -7893,7 +7897,7 @@
           <p:cNvPr id="3" name="Subtitle 2">
             <a:extLst>
               <a:ext uri="{FF2B5EF4-FFF2-40B4-BE49-F238E27FC236}">
-                <a16:creationId xmlns:a16="http://schemas.microsoft.com/office/drawing/2014/main" id="{476B5B34-7AB2-8B19-2254-C3D9E8FBA6BA}"/>
+                <a16:creationId xmlns:a16="http://schemas.microsoft.com/office/drawing/2014/main" xmlns="" id="{476B5B34-7AB2-8B19-2254-C3D9E8FBA6BA}"/>
               </a:ext>
             </a:extLst>
           </p:cNvPr>
@@ -7951,7 +7955,7 @@
           <p:cNvPr id="4" name="Picture 3" descr="Logo&#10;&#10;Description automatically generated">
             <a:extLst>
               <a:ext uri="{FF2B5EF4-FFF2-40B4-BE49-F238E27FC236}">
-                <a16:creationId xmlns:a16="http://schemas.microsoft.com/office/drawing/2014/main" id="{28A05A6E-AB93-28D6-45BA-C2A7DE8ACA0C}"/>
+                <a16:creationId xmlns:a16="http://schemas.microsoft.com/office/drawing/2014/main" xmlns="" id="{28A05A6E-AB93-28D6-45BA-C2A7DE8ACA0C}"/>
               </a:ext>
             </a:extLst>
           </p:cNvPr>
@@ -7987,7 +7991,7 @@
           <p:cNvPr id="5" name="Rectangle 4">
             <a:extLst>
               <a:ext uri="{FF2B5EF4-FFF2-40B4-BE49-F238E27FC236}">
-                <a16:creationId xmlns:a16="http://schemas.microsoft.com/office/drawing/2014/main" id="{65753E25-84F9-6E3D-5410-1B6DA7A49A5B}"/>
+                <a16:creationId xmlns:a16="http://schemas.microsoft.com/office/drawing/2014/main" xmlns="" id="{65753E25-84F9-6E3D-5410-1B6DA7A49A5B}"/>
               </a:ext>
             </a:extLst>
           </p:cNvPr>
@@ -8074,7 +8078,7 @@
           <p:cNvPr id="3" name="Subtitle 2">
             <a:extLst>
               <a:ext uri="{FF2B5EF4-FFF2-40B4-BE49-F238E27FC236}">
-                <a16:creationId xmlns:a16="http://schemas.microsoft.com/office/drawing/2014/main" id="{476B5B34-7AB2-8B19-2254-C3D9E8FBA6BA}"/>
+                <a16:creationId xmlns:a16="http://schemas.microsoft.com/office/drawing/2014/main" xmlns="" id="{476B5B34-7AB2-8B19-2254-C3D9E8FBA6BA}"/>
               </a:ext>
             </a:extLst>
           </p:cNvPr>
@@ -8177,7 +8181,7 @@
           <p:cNvPr id="4" name="Picture 3" descr="Logo&#10;&#10;Description automatically generated">
             <a:extLst>
               <a:ext uri="{FF2B5EF4-FFF2-40B4-BE49-F238E27FC236}">
-                <a16:creationId xmlns:a16="http://schemas.microsoft.com/office/drawing/2014/main" id="{28A05A6E-AB93-28D6-45BA-C2A7DE8ACA0C}"/>
+                <a16:creationId xmlns:a16="http://schemas.microsoft.com/office/drawing/2014/main" xmlns="" id="{28A05A6E-AB93-28D6-45BA-C2A7DE8ACA0C}"/>
               </a:ext>
             </a:extLst>
           </p:cNvPr>
@@ -8213,7 +8217,7 @@
           <p:cNvPr id="5" name="Rectangle 4">
             <a:extLst>
               <a:ext uri="{FF2B5EF4-FFF2-40B4-BE49-F238E27FC236}">
-                <a16:creationId xmlns:a16="http://schemas.microsoft.com/office/drawing/2014/main" id="{65753E25-84F9-6E3D-5410-1B6DA7A49A5B}"/>
+                <a16:creationId xmlns:a16="http://schemas.microsoft.com/office/drawing/2014/main" xmlns="" id="{65753E25-84F9-6E3D-5410-1B6DA7A49A5B}"/>
               </a:ext>
             </a:extLst>
           </p:cNvPr>
@@ -8300,7 +8304,7 @@
           <p:cNvPr id="3" name="Subtitle 2">
             <a:extLst>
               <a:ext uri="{FF2B5EF4-FFF2-40B4-BE49-F238E27FC236}">
-                <a16:creationId xmlns:a16="http://schemas.microsoft.com/office/drawing/2014/main" id="{476B5B34-7AB2-8B19-2254-C3D9E8FBA6BA}"/>
+                <a16:creationId xmlns:a16="http://schemas.microsoft.com/office/drawing/2014/main" xmlns="" id="{476B5B34-7AB2-8B19-2254-C3D9E8FBA6BA}"/>
               </a:ext>
             </a:extLst>
           </p:cNvPr>
@@ -8370,7 +8374,7 @@
           <p:cNvPr id="4" name="Picture 3" descr="Logo&#10;&#10;Description automatically generated">
             <a:extLst>
               <a:ext uri="{FF2B5EF4-FFF2-40B4-BE49-F238E27FC236}">
-                <a16:creationId xmlns:a16="http://schemas.microsoft.com/office/drawing/2014/main" id="{28A05A6E-AB93-28D6-45BA-C2A7DE8ACA0C}"/>
+                <a16:creationId xmlns:a16="http://schemas.microsoft.com/office/drawing/2014/main" xmlns="" id="{28A05A6E-AB93-28D6-45BA-C2A7DE8ACA0C}"/>
               </a:ext>
             </a:extLst>
           </p:cNvPr>
@@ -8406,7 +8410,7 @@
           <p:cNvPr id="5" name="Rectangle 4">
             <a:extLst>
               <a:ext uri="{FF2B5EF4-FFF2-40B4-BE49-F238E27FC236}">
-                <a16:creationId xmlns:a16="http://schemas.microsoft.com/office/drawing/2014/main" id="{65753E25-84F9-6E3D-5410-1B6DA7A49A5B}"/>
+                <a16:creationId xmlns:a16="http://schemas.microsoft.com/office/drawing/2014/main" xmlns="" id="{65753E25-84F9-6E3D-5410-1B6DA7A49A5B}"/>
               </a:ext>
             </a:extLst>
           </p:cNvPr>
@@ -8493,7 +8497,7 @@
           <p:cNvPr id="3" name="Subtitle 2">
             <a:extLst>
               <a:ext uri="{FF2B5EF4-FFF2-40B4-BE49-F238E27FC236}">
-                <a16:creationId xmlns:a16="http://schemas.microsoft.com/office/drawing/2014/main" id="{476B5B34-7AB2-8B19-2254-C3D9E8FBA6BA}"/>
+                <a16:creationId xmlns:a16="http://schemas.microsoft.com/office/drawing/2014/main" xmlns="" id="{476B5B34-7AB2-8B19-2254-C3D9E8FBA6BA}"/>
               </a:ext>
             </a:extLst>
           </p:cNvPr>
@@ -8874,7 +8878,7 @@
           <p:cNvPr id="4" name="Picture 3" descr="Logo&#10;&#10;Description automatically generated">
             <a:extLst>
               <a:ext uri="{FF2B5EF4-FFF2-40B4-BE49-F238E27FC236}">
-                <a16:creationId xmlns:a16="http://schemas.microsoft.com/office/drawing/2014/main" id="{28A05A6E-AB93-28D6-45BA-C2A7DE8ACA0C}"/>
+                <a16:creationId xmlns:a16="http://schemas.microsoft.com/office/drawing/2014/main" xmlns="" id="{28A05A6E-AB93-28D6-45BA-C2A7DE8ACA0C}"/>
               </a:ext>
             </a:extLst>
           </p:cNvPr>
@@ -8910,7 +8914,7 @@
           <p:cNvPr id="5" name="Rectangle 4">
             <a:extLst>
               <a:ext uri="{FF2B5EF4-FFF2-40B4-BE49-F238E27FC236}">
-                <a16:creationId xmlns:a16="http://schemas.microsoft.com/office/drawing/2014/main" id="{65753E25-84F9-6E3D-5410-1B6DA7A49A5B}"/>
+                <a16:creationId xmlns:a16="http://schemas.microsoft.com/office/drawing/2014/main" xmlns="" id="{65753E25-84F9-6E3D-5410-1B6DA7A49A5B}"/>
               </a:ext>
             </a:extLst>
           </p:cNvPr>
@@ -8997,7 +9001,7 @@
           <p:cNvPr id="3" name="Subtitle 2">
             <a:extLst>
               <a:ext uri="{FF2B5EF4-FFF2-40B4-BE49-F238E27FC236}">
-                <a16:creationId xmlns:a16="http://schemas.microsoft.com/office/drawing/2014/main" id="{476B5B34-7AB2-8B19-2254-C3D9E8FBA6BA}"/>
+                <a16:creationId xmlns:a16="http://schemas.microsoft.com/office/drawing/2014/main" xmlns="" id="{476B5B34-7AB2-8B19-2254-C3D9E8FBA6BA}"/>
               </a:ext>
             </a:extLst>
           </p:cNvPr>
@@ -9112,7 +9116,7 @@
           <p:cNvPr id="4" name="Picture 3" descr="Logo&#10;&#10;Description automatically generated">
             <a:extLst>
               <a:ext uri="{FF2B5EF4-FFF2-40B4-BE49-F238E27FC236}">
-                <a16:creationId xmlns:a16="http://schemas.microsoft.com/office/drawing/2014/main" id="{28A05A6E-AB93-28D6-45BA-C2A7DE8ACA0C}"/>
+                <a16:creationId xmlns:a16="http://schemas.microsoft.com/office/drawing/2014/main" xmlns="" id="{28A05A6E-AB93-28D6-45BA-C2A7DE8ACA0C}"/>
               </a:ext>
             </a:extLst>
           </p:cNvPr>
@@ -9148,7 +9152,7 @@
           <p:cNvPr id="5" name="Rectangle 4">
             <a:extLst>
               <a:ext uri="{FF2B5EF4-FFF2-40B4-BE49-F238E27FC236}">
-                <a16:creationId xmlns:a16="http://schemas.microsoft.com/office/drawing/2014/main" id="{65753E25-84F9-6E3D-5410-1B6DA7A49A5B}"/>
+                <a16:creationId xmlns:a16="http://schemas.microsoft.com/office/drawing/2014/main" xmlns="" id="{65753E25-84F9-6E3D-5410-1B6DA7A49A5B}"/>
               </a:ext>
             </a:extLst>
           </p:cNvPr>
@@ -9235,7 +9239,7 @@
           <p:cNvPr id="3" name="Subtitle 2">
             <a:extLst>
               <a:ext uri="{FF2B5EF4-FFF2-40B4-BE49-F238E27FC236}">
-                <a16:creationId xmlns:a16="http://schemas.microsoft.com/office/drawing/2014/main" id="{476B5B34-7AB2-8B19-2254-C3D9E8FBA6BA}"/>
+                <a16:creationId xmlns:a16="http://schemas.microsoft.com/office/drawing/2014/main" xmlns="" id="{476B5B34-7AB2-8B19-2254-C3D9E8FBA6BA}"/>
               </a:ext>
             </a:extLst>
           </p:cNvPr>
@@ -9326,7 +9330,7 @@
           <p:cNvPr id="4" name="Picture 3" descr="Logo&#10;&#10;Description automatically generated">
             <a:extLst>
               <a:ext uri="{FF2B5EF4-FFF2-40B4-BE49-F238E27FC236}">
-                <a16:creationId xmlns:a16="http://schemas.microsoft.com/office/drawing/2014/main" id="{28A05A6E-AB93-28D6-45BA-C2A7DE8ACA0C}"/>
+                <a16:creationId xmlns:a16="http://schemas.microsoft.com/office/drawing/2014/main" xmlns="" id="{28A05A6E-AB93-28D6-45BA-C2A7DE8ACA0C}"/>
               </a:ext>
             </a:extLst>
           </p:cNvPr>
@@ -9362,7 +9366,7 @@
           <p:cNvPr id="5" name="Rectangle 4">
             <a:extLst>
               <a:ext uri="{FF2B5EF4-FFF2-40B4-BE49-F238E27FC236}">
-                <a16:creationId xmlns:a16="http://schemas.microsoft.com/office/drawing/2014/main" id="{65753E25-84F9-6E3D-5410-1B6DA7A49A5B}"/>
+                <a16:creationId xmlns:a16="http://schemas.microsoft.com/office/drawing/2014/main" xmlns="" id="{65753E25-84F9-6E3D-5410-1B6DA7A49A5B}"/>
               </a:ext>
             </a:extLst>
           </p:cNvPr>
@@ -9449,7 +9453,7 @@
           <p:cNvPr id="3" name="Subtitle 2">
             <a:extLst>
               <a:ext uri="{FF2B5EF4-FFF2-40B4-BE49-F238E27FC236}">
-                <a16:creationId xmlns:a16="http://schemas.microsoft.com/office/drawing/2014/main" id="{476B5B34-7AB2-8B19-2254-C3D9E8FBA6BA}"/>
+                <a16:creationId xmlns:a16="http://schemas.microsoft.com/office/drawing/2014/main" xmlns="" id="{476B5B34-7AB2-8B19-2254-C3D9E8FBA6BA}"/>
               </a:ext>
             </a:extLst>
           </p:cNvPr>
@@ -9665,7 +9669,7 @@
           <p:cNvPr id="4" name="Picture 3" descr="Logo&#10;&#10;Description automatically generated">
             <a:extLst>
               <a:ext uri="{FF2B5EF4-FFF2-40B4-BE49-F238E27FC236}">
-                <a16:creationId xmlns:a16="http://schemas.microsoft.com/office/drawing/2014/main" id="{28A05A6E-AB93-28D6-45BA-C2A7DE8ACA0C}"/>
+                <a16:creationId xmlns:a16="http://schemas.microsoft.com/office/drawing/2014/main" xmlns="" id="{28A05A6E-AB93-28D6-45BA-C2A7DE8ACA0C}"/>
               </a:ext>
             </a:extLst>
           </p:cNvPr>
@@ -9701,7 +9705,7 @@
           <p:cNvPr id="5" name="Rectangle 4">
             <a:extLst>
               <a:ext uri="{FF2B5EF4-FFF2-40B4-BE49-F238E27FC236}">
-                <a16:creationId xmlns:a16="http://schemas.microsoft.com/office/drawing/2014/main" id="{65753E25-84F9-6E3D-5410-1B6DA7A49A5B}"/>
+                <a16:creationId xmlns:a16="http://schemas.microsoft.com/office/drawing/2014/main" xmlns="" id="{65753E25-84F9-6E3D-5410-1B6DA7A49A5B}"/>
               </a:ext>
             </a:extLst>
           </p:cNvPr>

</xml_diff>